<commit_message>
Updating manual with new images
</commit_message>
<xml_diff>
--- a/gomobile/docs/manual/developermanual/images/Diagrams.pptx
+++ b/gomobile/docs/manual/developermanual/images/Diagrams.pptx
@@ -2,12 +2,13 @@
 <file path=ppt/presentation.xml><?xml version="1.0" encoding="utf-8"?>
 <p:presentation xmlns:a="http://schemas.openxmlformats.org/drawingml/2006/main" xmlns:r="http://schemas.openxmlformats.org/officeDocument/2006/relationships" xmlns:mc="http://schemas.openxmlformats.org/markup-compatibility/2006" xmlns:mv="urn:schemas-microsoft-com:mac:vml" xmlns:p="http://schemas.openxmlformats.org/presentationml/2006/main" mc:Ignorable="mv" mc:PreserveAttributes="mv:*" saveSubsetFonts="1" autoCompressPictures="0">
   <p:sldMasterIdLst>
-    <p:sldMasterId id="2147483648" r:id="rId1"/>
+    <p:sldMasterId r:id="rId1"/>
   </p:sldMasterIdLst>
   <p:sldIdLst>
     <p:sldId id="256" r:id="rId2"/>
     <p:sldId id="257" r:id="rId3"/>
     <p:sldId id="258" r:id="rId4"/>
+    <p:sldId id="259" r:id="rId5"/>
   </p:sldIdLst>
   <p:sldSz cx="9144000" cy="6858000" type="screen4x3"/>
   <p:notesSz cx="6858000" cy="9144000"/>
@@ -291,7 +292,7 @@
             <a:fld id="{606A0E19-4095-DD4B-BEE7-526A527832D2}" type="datetimeFigureOut">
               <a:rPr lang="en-US" smtClean="0"/>
               <a:pPr/>
-              <a:t>15.3.2010</a:t>
+              <a:t>4/17/10</a:t>
             </a:fld>
             <a:endParaRPr lang="en-US"/>
           </a:p>
@@ -458,7 +459,7 @@
             <a:fld id="{606A0E19-4095-DD4B-BEE7-526A527832D2}" type="datetimeFigureOut">
               <a:rPr lang="en-US" smtClean="0"/>
               <a:pPr/>
-              <a:t>15.3.2010</a:t>
+              <a:t>4/17/10</a:t>
             </a:fld>
             <a:endParaRPr lang="en-US"/>
           </a:p>
@@ -635,7 +636,7 @@
             <a:fld id="{606A0E19-4095-DD4B-BEE7-526A527832D2}" type="datetimeFigureOut">
               <a:rPr lang="en-US" smtClean="0"/>
               <a:pPr/>
-              <a:t>15.3.2010</a:t>
+              <a:t>4/17/10</a:t>
             </a:fld>
             <a:endParaRPr lang="en-US"/>
           </a:p>
@@ -802,7 +803,7 @@
             <a:fld id="{606A0E19-4095-DD4B-BEE7-526A527832D2}" type="datetimeFigureOut">
               <a:rPr lang="en-US" smtClean="0"/>
               <a:pPr/>
-              <a:t>15.3.2010</a:t>
+              <a:t>4/17/10</a:t>
             </a:fld>
             <a:endParaRPr lang="en-US"/>
           </a:p>
@@ -1045,7 +1046,7 @@
             <a:fld id="{606A0E19-4095-DD4B-BEE7-526A527832D2}" type="datetimeFigureOut">
               <a:rPr lang="en-US" smtClean="0"/>
               <a:pPr/>
-              <a:t>15.3.2010</a:t>
+              <a:t>4/17/10</a:t>
             </a:fld>
             <a:endParaRPr lang="en-US"/>
           </a:p>
@@ -1330,7 +1331,7 @@
             <a:fld id="{606A0E19-4095-DD4B-BEE7-526A527832D2}" type="datetimeFigureOut">
               <a:rPr lang="en-US" smtClean="0"/>
               <a:pPr/>
-              <a:t>15.3.2010</a:t>
+              <a:t>4/17/10</a:t>
             </a:fld>
             <a:endParaRPr lang="en-US"/>
           </a:p>
@@ -1749,7 +1750,7 @@
             <a:fld id="{606A0E19-4095-DD4B-BEE7-526A527832D2}" type="datetimeFigureOut">
               <a:rPr lang="en-US" smtClean="0"/>
               <a:pPr/>
-              <a:t>15.3.2010</a:t>
+              <a:t>4/17/10</a:t>
             </a:fld>
             <a:endParaRPr lang="en-US"/>
           </a:p>
@@ -1864,7 +1865,7 @@
             <a:fld id="{606A0E19-4095-DD4B-BEE7-526A527832D2}" type="datetimeFigureOut">
               <a:rPr lang="en-US" smtClean="0"/>
               <a:pPr/>
-              <a:t>15.3.2010</a:t>
+              <a:t>4/17/10</a:t>
             </a:fld>
             <a:endParaRPr lang="en-US"/>
           </a:p>
@@ -1956,7 +1957,7 @@
             <a:fld id="{606A0E19-4095-DD4B-BEE7-526A527832D2}" type="datetimeFigureOut">
               <a:rPr lang="en-US" smtClean="0"/>
               <a:pPr/>
-              <a:t>15.3.2010</a:t>
+              <a:t>4/17/10</a:t>
             </a:fld>
             <a:endParaRPr lang="en-US"/>
           </a:p>
@@ -2230,7 +2231,7 @@
             <a:fld id="{606A0E19-4095-DD4B-BEE7-526A527832D2}" type="datetimeFigureOut">
               <a:rPr lang="en-US" smtClean="0"/>
               <a:pPr/>
-              <a:t>15.3.2010</a:t>
+              <a:t>4/17/10</a:t>
             </a:fld>
             <a:endParaRPr lang="en-US"/>
           </a:p>
@@ -2480,7 +2481,7 @@
             <a:fld id="{606A0E19-4095-DD4B-BEE7-526A527832D2}" type="datetimeFigureOut">
               <a:rPr lang="en-US" smtClean="0"/>
               <a:pPr/>
-              <a:t>15.3.2010</a:t>
+              <a:t>4/17/10</a:t>
             </a:fld>
             <a:endParaRPr lang="en-US"/>
           </a:p>
@@ -2690,7 +2691,7 @@
             <a:fld id="{606A0E19-4095-DD4B-BEE7-526A527832D2}" type="datetimeFigureOut">
               <a:rPr lang="en-US" smtClean="0"/>
               <a:pPr/>
-              <a:t>15.3.2010</a:t>
+              <a:t>4/17/10</a:t>
             </a:fld>
             <a:endParaRPr lang="en-US"/>
           </a:p>
@@ -2779,17 +2780,17 @@
   </p:cSld>
   <p:clrMap bg1="lt1" tx1="dk1" bg2="lt2" tx2="dk2" accent1="accent1" accent2="accent2" accent3="accent3" accent4="accent4" accent5="accent5" accent6="accent6" hlink="hlink" folHlink="folHlink"/>
   <p:sldLayoutIdLst>
-    <p:sldLayoutId id="2147483649" r:id="rId1"/>
-    <p:sldLayoutId id="2147483650" r:id="rId2"/>
-    <p:sldLayoutId id="2147483651" r:id="rId3"/>
-    <p:sldLayoutId id="2147483652" r:id="rId4"/>
-    <p:sldLayoutId id="2147483653" r:id="rId5"/>
-    <p:sldLayoutId id="2147483654" r:id="rId6"/>
-    <p:sldLayoutId id="2147483655" r:id="rId7"/>
-    <p:sldLayoutId id="2147483656" r:id="rId8"/>
-    <p:sldLayoutId id="2147483657" r:id="rId9"/>
-    <p:sldLayoutId id="2147483658" r:id="rId10"/>
-    <p:sldLayoutId id="2147483659" r:id="rId11"/>
+    <p:sldLayoutId r:id="rId1"/>
+    <p:sldLayoutId r:id="rId2"/>
+    <p:sldLayoutId r:id="rId3"/>
+    <p:sldLayoutId r:id="rId4"/>
+    <p:sldLayoutId r:id="rId5"/>
+    <p:sldLayoutId r:id="rId6"/>
+    <p:sldLayoutId r:id="rId7"/>
+    <p:sldLayoutId r:id="rId8"/>
+    <p:sldLayoutId r:id="rId9"/>
+    <p:sldLayoutId r:id="rId10"/>
+    <p:sldLayoutId r:id="rId11"/>
   </p:sldLayoutIdLst>
   <p:txStyles>
     <p:titleStyle>
@@ -4576,11 +4577,7 @@
           <a:p>
             <a:r>
               <a:rPr lang="fi-FI" sz="1600" dirty="0" err="1" smtClean="0"/>
-              <a:t>U</a:t>
-            </a:r>
-            <a:r>
-              <a:rPr lang="fi-FI" sz="1600" dirty="0" err="1" smtClean="0"/>
-              <a:t>ser</a:t>
+              <a:t>User</a:t>
             </a:r>
             <a:r>
               <a:rPr lang="fi-FI" sz="1600" dirty="0" smtClean="0"/>
@@ -4611,11 +4608,7 @@
           <a:p>
             <a:r>
               <a:rPr lang="fi-FI" sz="1600" dirty="0" smtClean="0"/>
-              <a:t>a</a:t>
-            </a:r>
-            <a:r>
-              <a:rPr lang="fi-FI" sz="1600" dirty="0" smtClean="0"/>
-              <a:t>nd </a:t>
+              <a:t>and </a:t>
             </a:r>
             <a:r>
               <a:rPr lang="fi-FI" sz="1600" dirty="0" err="1" smtClean="0"/>
@@ -4642,11 +4635,7 @@
           <a:p>
             <a:r>
               <a:rPr lang="fi-FI" sz="1600" b="1" dirty="0" err="1" smtClean="0"/>
-              <a:t>o</a:t>
-            </a:r>
-            <a:r>
-              <a:rPr lang="fi-FI" sz="1600" b="1" dirty="0" err="1" smtClean="0"/>
-              <a:t>r</a:t>
+              <a:t>or</a:t>
             </a:r>
             <a:endParaRPr lang="fi-FI" sz="1600" b="1" dirty="0" smtClean="0"/>
           </a:p>
@@ -4794,15 +4783,7 @@
             </a:r>
             <a:r>
               <a:rPr lang="fi-FI" dirty="0" err="1" smtClean="0"/>
-              <a:t>go_to_web</a:t>
-            </a:r>
-            <a:r>
-              <a:rPr lang="fi-FI" dirty="0" err="1" smtClean="0"/>
-              <a:t>_</a:t>
-            </a:r>
-            <a:r>
-              <a:rPr lang="fi-FI" dirty="0" err="1" smtClean="0"/>
-              <a:t>site</a:t>
+              <a:t>go_to_web_site</a:t>
             </a:r>
             <a:r>
               <a:rPr lang="fi-FI" dirty="0" smtClean="0"/>
@@ -4942,6 +4923,685 @@
       </p:par>
     </p:tnLst>
   </p:timing>
+</p:sld>
+</file>
+
+<file path=ppt/slides/slide4.xml><?xml version="1.0" encoding="utf-8"?>
+<p:sld xmlns:a="http://schemas.openxmlformats.org/drawingml/2006/main" xmlns:r="http://schemas.openxmlformats.org/officeDocument/2006/relationships" xmlns:mc="http://schemas.openxmlformats.org/markup-compatibility/2006" xmlns:mv="urn:schemas-microsoft-com:mac:vml" xmlns:p="http://schemas.openxmlformats.org/presentationml/2006/main" mc:Ignorable="mv" mc:PreserveAttributes="mv:*">
+  <p:cSld>
+    <p:bg>
+      <p:bgPr>
+        <a:solidFill>
+          <a:srgbClr val="F5F5F5"/>
+        </a:solidFill>
+        <a:effectLst/>
+      </p:bgPr>
+    </p:bg>
+    <p:spTree>
+      <p:nvGrpSpPr>
+        <p:cNvPr id="1" name=""/>
+        <p:cNvGrpSpPr/>
+        <p:nvPr/>
+      </p:nvGrpSpPr>
+      <p:grpSpPr>
+        <a:xfrm>
+          <a:off x="0" y="0"/>
+          <a:ext cx="0" cy="0"/>
+          <a:chOff x="0" y="0"/>
+          <a:chExt cx="0" cy="0"/>
+        </a:xfrm>
+      </p:grpSpPr>
+      <p:sp>
+        <p:nvSpPr>
+          <p:cNvPr id="3" name="Rectangle 2"/>
+          <p:cNvSpPr/>
+          <p:nvPr/>
+        </p:nvSpPr>
+        <p:spPr>
+          <a:xfrm>
+            <a:off x="3276600" y="228600"/>
+            <a:ext cx="2133600" cy="1143000"/>
+          </a:xfrm>
+          <a:prstGeom prst="rect">
+            <a:avLst/>
+          </a:prstGeom>
+          <a:solidFill>
+            <a:srgbClr val="61BF1A"/>
+          </a:solidFill>
+          <a:ln w="76200" cap="flat" cmpd="sng" algn="ctr">
+            <a:solidFill>
+              <a:schemeClr val="tx1"/>
+            </a:solidFill>
+            <a:prstDash val="solid"/>
+            <a:round/>
+            <a:headEnd type="none" w="med" len="med"/>
+            <a:tailEnd type="none" w="med" len="med"/>
+          </a:ln>
+          <a:effectLst/>
+        </p:spPr>
+        <p:style>
+          <a:lnRef idx="1">
+            <a:schemeClr val="accent3"/>
+          </a:lnRef>
+          <a:fillRef idx="3">
+            <a:schemeClr val="accent3"/>
+          </a:fillRef>
+          <a:effectRef idx="2">
+            <a:schemeClr val="accent3"/>
+          </a:effectRef>
+          <a:fontRef idx="minor">
+            <a:schemeClr val="lt1"/>
+          </a:fontRef>
+        </p:style>
+        <p:txBody>
+          <a:bodyPr rtlCol="0" anchor="ctr"/>
+          <a:lstStyle/>
+          <a:p>
+            <a:pPr algn="ctr"/>
+            <a:r>
+              <a:rPr lang="en-US" dirty="0" smtClean="0">
+                <a:latin typeface="Arial"/>
+                <a:cs typeface="Arial"/>
+              </a:rPr>
+              <a:t>Go Mobile for </a:t>
+            </a:r>
+            <a:r>
+              <a:rPr lang="en-US" dirty="0" err="1" smtClean="0">
+                <a:latin typeface="Arial"/>
+                <a:cs typeface="Arial"/>
+              </a:rPr>
+              <a:t>Plone</a:t>
+            </a:r>
+            <a:endParaRPr lang="en-US" dirty="0">
+              <a:latin typeface="Arial"/>
+              <a:cs typeface="Arial"/>
+            </a:endParaRPr>
+          </a:p>
+        </p:txBody>
+      </p:sp>
+      <p:sp>
+        <p:nvSpPr>
+          <p:cNvPr id="4" name="Down Arrow 3"/>
+          <p:cNvSpPr/>
+          <p:nvPr/>
+        </p:nvSpPr>
+        <p:spPr>
+          <a:xfrm>
+            <a:off x="762000" y="1905000"/>
+            <a:ext cx="914400" cy="1066800"/>
+          </a:xfrm>
+          <a:prstGeom prst="downArrow">
+            <a:avLst/>
+          </a:prstGeom>
+          <a:solidFill>
+            <a:srgbClr val="03302D"/>
+          </a:solidFill>
+          <a:ln w="38100" cap="flat" cmpd="sng" algn="ctr">
+            <a:solidFill>
+              <a:schemeClr val="tx1"/>
+            </a:solidFill>
+            <a:prstDash val="solid"/>
+            <a:round/>
+            <a:headEnd type="none" w="med" len="med"/>
+            <a:tailEnd type="none" w="med" len="med"/>
+          </a:ln>
+          <a:effectLst/>
+        </p:spPr>
+        <p:style>
+          <a:lnRef idx="1">
+            <a:schemeClr val="accent3"/>
+          </a:lnRef>
+          <a:fillRef idx="3">
+            <a:schemeClr val="accent3"/>
+          </a:fillRef>
+          <a:effectRef idx="2">
+            <a:schemeClr val="accent3"/>
+          </a:effectRef>
+          <a:fontRef idx="minor">
+            <a:schemeClr val="lt1"/>
+          </a:fontRef>
+        </p:style>
+        <p:txBody>
+          <a:bodyPr rtlCol="0" anchor="ctr"/>
+          <a:lstStyle/>
+          <a:p>
+            <a:pPr algn="ctr"/>
+            <a:endParaRPr lang="en-US" dirty="0" err="1" smtClean="0"/>
+          </a:p>
+        </p:txBody>
+      </p:sp>
+      <p:sp>
+        <p:nvSpPr>
+          <p:cNvPr id="10" name="Rectangle 9"/>
+          <p:cNvSpPr/>
+          <p:nvPr/>
+        </p:nvSpPr>
+        <p:spPr>
+          <a:xfrm>
+            <a:off x="152400" y="228600"/>
+            <a:ext cx="2133600" cy="1143000"/>
+          </a:xfrm>
+          <a:prstGeom prst="rect">
+            <a:avLst/>
+          </a:prstGeom>
+          <a:solidFill>
+            <a:srgbClr val="61BF1A"/>
+          </a:solidFill>
+          <a:ln w="76200" cap="flat" cmpd="sng" algn="ctr">
+            <a:solidFill>
+              <a:schemeClr val="tx1"/>
+            </a:solidFill>
+            <a:prstDash val="solid"/>
+            <a:round/>
+            <a:headEnd type="none" w="med" len="med"/>
+            <a:tailEnd type="none" w="med" len="med"/>
+          </a:ln>
+          <a:effectLst/>
+        </p:spPr>
+        <p:style>
+          <a:lnRef idx="1">
+            <a:schemeClr val="accent3"/>
+          </a:lnRef>
+          <a:fillRef idx="3">
+            <a:schemeClr val="accent3"/>
+          </a:fillRef>
+          <a:effectRef idx="2">
+            <a:schemeClr val="accent3"/>
+          </a:effectRef>
+          <a:fontRef idx="minor">
+            <a:schemeClr val="lt1"/>
+          </a:fontRef>
+        </p:style>
+        <p:txBody>
+          <a:bodyPr rtlCol="0" anchor="ctr"/>
+          <a:lstStyle/>
+          <a:p>
+            <a:pPr algn="ctr"/>
+            <a:r>
+              <a:rPr lang="en-US" dirty="0" err="1" smtClean="0">
+                <a:latin typeface="Arial"/>
+                <a:cs typeface="Arial"/>
+              </a:rPr>
+              <a:t>Plone</a:t>
+            </a:r>
+            <a:r>
+              <a:rPr lang="en-US" dirty="0" smtClean="0">
+                <a:latin typeface="Arial"/>
+                <a:cs typeface="Arial"/>
+              </a:rPr>
+              <a:t> CMS</a:t>
+            </a:r>
+            <a:endParaRPr lang="en-US" dirty="0">
+              <a:latin typeface="Arial"/>
+              <a:cs typeface="Arial"/>
+            </a:endParaRPr>
+          </a:p>
+        </p:txBody>
+      </p:sp>
+      <p:sp>
+        <p:nvSpPr>
+          <p:cNvPr id="11" name="Rectangle 10"/>
+          <p:cNvSpPr/>
+          <p:nvPr/>
+        </p:nvSpPr>
+        <p:spPr>
+          <a:xfrm>
+            <a:off x="6324600" y="228600"/>
+            <a:ext cx="2133600" cy="1143000"/>
+          </a:xfrm>
+          <a:prstGeom prst="rect">
+            <a:avLst/>
+          </a:prstGeom>
+          <a:solidFill>
+            <a:srgbClr val="61BF1A"/>
+          </a:solidFill>
+          <a:ln w="76200" cap="flat" cmpd="sng" algn="ctr">
+            <a:solidFill>
+              <a:schemeClr val="tx1"/>
+            </a:solidFill>
+            <a:prstDash val="solid"/>
+            <a:round/>
+            <a:headEnd type="none" w="med" len="med"/>
+            <a:tailEnd type="none" w="med" len="med"/>
+          </a:ln>
+          <a:effectLst/>
+        </p:spPr>
+        <p:style>
+          <a:lnRef idx="1">
+            <a:schemeClr val="accent3"/>
+          </a:lnRef>
+          <a:fillRef idx="3">
+            <a:schemeClr val="accent3"/>
+          </a:fillRef>
+          <a:effectRef idx="2">
+            <a:schemeClr val="accent3"/>
+          </a:effectRef>
+          <a:fontRef idx="minor">
+            <a:schemeClr val="lt1"/>
+          </a:fontRef>
+        </p:style>
+        <p:txBody>
+          <a:bodyPr rtlCol="0" anchor="ctr"/>
+          <a:lstStyle/>
+          <a:p>
+            <a:pPr algn="ctr"/>
+            <a:r>
+              <a:rPr lang="en-US" dirty="0" smtClean="0">
+                <a:latin typeface="Arial"/>
+                <a:cs typeface="Arial"/>
+              </a:rPr>
+              <a:t>Go Mobile for </a:t>
+            </a:r>
+            <a:r>
+              <a:rPr lang="en-US" dirty="0" err="1" smtClean="0">
+                <a:latin typeface="Arial"/>
+                <a:cs typeface="Arial"/>
+              </a:rPr>
+              <a:t>Plone</a:t>
+            </a:r>
+            <a:r>
+              <a:rPr lang="en-US" dirty="0" smtClean="0">
+                <a:latin typeface="Arial"/>
+                <a:cs typeface="Arial"/>
+              </a:rPr>
+              <a:t> with convergence</a:t>
+            </a:r>
+            <a:endParaRPr lang="en-US" dirty="0">
+              <a:latin typeface="Arial"/>
+              <a:cs typeface="Arial"/>
+            </a:endParaRPr>
+          </a:p>
+        </p:txBody>
+      </p:sp>
+      <p:sp>
+        <p:nvSpPr>
+          <p:cNvPr id="12" name="Down Arrow 11"/>
+          <p:cNvSpPr/>
+          <p:nvPr/>
+        </p:nvSpPr>
+        <p:spPr>
+          <a:xfrm>
+            <a:off x="3886200" y="1905000"/>
+            <a:ext cx="914400" cy="1066800"/>
+          </a:xfrm>
+          <a:prstGeom prst="downArrow">
+            <a:avLst/>
+          </a:prstGeom>
+          <a:solidFill>
+            <a:srgbClr val="03302D"/>
+          </a:solidFill>
+          <a:ln w="38100" cap="flat" cmpd="sng" algn="ctr">
+            <a:solidFill>
+              <a:schemeClr val="tx1"/>
+            </a:solidFill>
+            <a:prstDash val="solid"/>
+            <a:round/>
+            <a:headEnd type="none" w="med" len="med"/>
+            <a:tailEnd type="none" w="med" len="med"/>
+          </a:ln>
+          <a:effectLst/>
+        </p:spPr>
+        <p:style>
+          <a:lnRef idx="1">
+            <a:schemeClr val="accent3"/>
+          </a:lnRef>
+          <a:fillRef idx="3">
+            <a:schemeClr val="accent3"/>
+          </a:fillRef>
+          <a:effectRef idx="2">
+            <a:schemeClr val="accent3"/>
+          </a:effectRef>
+          <a:fontRef idx="minor">
+            <a:schemeClr val="lt1"/>
+          </a:fontRef>
+        </p:style>
+        <p:txBody>
+          <a:bodyPr rtlCol="0" anchor="ctr"/>
+          <a:lstStyle/>
+          <a:p>
+            <a:pPr algn="ctr"/>
+            <a:endParaRPr lang="en-US" dirty="0" err="1" smtClean="0"/>
+          </a:p>
+        </p:txBody>
+      </p:sp>
+      <p:sp>
+        <p:nvSpPr>
+          <p:cNvPr id="13" name="Down Arrow 12"/>
+          <p:cNvSpPr/>
+          <p:nvPr/>
+        </p:nvSpPr>
+        <p:spPr>
+          <a:xfrm>
+            <a:off x="6934200" y="1905000"/>
+            <a:ext cx="914400" cy="1066800"/>
+          </a:xfrm>
+          <a:prstGeom prst="downArrow">
+            <a:avLst/>
+          </a:prstGeom>
+          <a:solidFill>
+            <a:srgbClr val="03302D"/>
+          </a:solidFill>
+          <a:ln w="38100" cap="flat" cmpd="sng" algn="ctr">
+            <a:solidFill>
+              <a:schemeClr val="tx1"/>
+            </a:solidFill>
+            <a:prstDash val="solid"/>
+            <a:round/>
+            <a:headEnd type="none" w="med" len="med"/>
+            <a:tailEnd type="none" w="med" len="med"/>
+          </a:ln>
+          <a:effectLst/>
+        </p:spPr>
+        <p:style>
+          <a:lnRef idx="1">
+            <a:schemeClr val="accent3"/>
+          </a:lnRef>
+          <a:fillRef idx="3">
+            <a:schemeClr val="accent3"/>
+          </a:fillRef>
+          <a:effectRef idx="2">
+            <a:schemeClr val="accent3"/>
+          </a:effectRef>
+          <a:fontRef idx="minor">
+            <a:schemeClr val="lt1"/>
+          </a:fontRef>
+        </p:style>
+        <p:txBody>
+          <a:bodyPr rtlCol="0" anchor="ctr"/>
+          <a:lstStyle/>
+          <a:p>
+            <a:pPr algn="ctr"/>
+            <a:endParaRPr lang="en-US" dirty="0" err="1" smtClean="0"/>
+          </a:p>
+        </p:txBody>
+      </p:sp>
+      <p:sp>
+        <p:nvSpPr>
+          <p:cNvPr id="17" name="TextBox 16"/>
+          <p:cNvSpPr txBox="1"/>
+          <p:nvPr/>
+        </p:nvSpPr>
+        <p:spPr>
+          <a:xfrm>
+            <a:off x="521996" y="4996934"/>
+            <a:ext cx="1403750" cy="369332"/>
+          </a:xfrm>
+          <a:prstGeom prst="rect">
+            <a:avLst/>
+          </a:prstGeom>
+          <a:noFill/>
+        </p:spPr>
+        <p:txBody>
+          <a:bodyPr wrap="none" rtlCol="0">
+            <a:spAutoFit/>
+          </a:bodyPr>
+          <a:lstStyle/>
+          <a:p>
+            <a:r>
+              <a:rPr lang="en-US" dirty="0" smtClean="0">
+                <a:latin typeface="Arial"/>
+                <a:cs typeface="Arial"/>
+              </a:rPr>
+              <a:t>p</a:t>
+            </a:r>
+            <a:r>
+              <a:rPr lang="en-US" dirty="0" smtClean="0">
+                <a:latin typeface="Arial"/>
+                <a:cs typeface="Arial"/>
+              </a:rPr>
+              <a:t>ublish web</a:t>
+            </a:r>
+            <a:endParaRPr lang="en-US" dirty="0">
+              <a:latin typeface="Arial"/>
+              <a:cs typeface="Arial"/>
+            </a:endParaRPr>
+          </a:p>
+        </p:txBody>
+      </p:sp>
+      <p:pic>
+        <p:nvPicPr>
+          <p:cNvPr id="18" name="Picture 17"/>
+          <p:cNvPicPr>
+            <a:picLocks noChangeAspect="1"/>
+          </p:cNvPicPr>
+          <p:nvPr/>
+        </p:nvPicPr>
+        <p:blipFill>
+          <a:blip r:embed="rId2"/>
+          <a:stretch>
+            <a:fillRect/>
+          </a:stretch>
+        </p:blipFill>
+        <p:spPr>
+          <a:xfrm>
+            <a:off x="6549351" y="3246058"/>
+            <a:ext cx="769697" cy="762000"/>
+          </a:xfrm>
+          <a:prstGeom prst="rect">
+            <a:avLst/>
+          </a:prstGeom>
+        </p:spPr>
+      </p:pic>
+      <p:sp>
+        <p:nvSpPr>
+          <p:cNvPr id="22" name="TextBox 21"/>
+          <p:cNvSpPr txBox="1"/>
+          <p:nvPr/>
+        </p:nvSpPr>
+        <p:spPr>
+          <a:xfrm>
+            <a:off x="3565326" y="4996934"/>
+            <a:ext cx="1660280" cy="369332"/>
+          </a:xfrm>
+          <a:prstGeom prst="rect">
+            <a:avLst/>
+          </a:prstGeom>
+          <a:noFill/>
+        </p:spPr>
+        <p:txBody>
+          <a:bodyPr wrap="none" rtlCol="0">
+            <a:spAutoFit/>
+          </a:bodyPr>
+          <a:lstStyle/>
+          <a:p>
+            <a:r>
+              <a:rPr lang="en-US" dirty="0" smtClean="0">
+                <a:latin typeface="Arial"/>
+                <a:cs typeface="Arial"/>
+              </a:rPr>
+              <a:t>p</a:t>
+            </a:r>
+            <a:r>
+              <a:rPr lang="en-US" dirty="0" smtClean="0">
+                <a:latin typeface="Arial"/>
+                <a:cs typeface="Arial"/>
+              </a:rPr>
+              <a:t>ublish mobile</a:t>
+            </a:r>
+            <a:endParaRPr lang="en-US" dirty="0">
+              <a:latin typeface="Arial"/>
+              <a:cs typeface="Arial"/>
+            </a:endParaRPr>
+          </a:p>
+        </p:txBody>
+      </p:sp>
+      <p:pic>
+        <p:nvPicPr>
+          <p:cNvPr id="25" name="Picture 24" descr="phone.png"/>
+          <p:cNvPicPr>
+            <a:picLocks noChangeAspect="1"/>
+          </p:cNvPicPr>
+          <p:nvPr/>
+        </p:nvPicPr>
+        <p:blipFill>
+          <a:blip r:embed="rId3"/>
+          <a:stretch>
+            <a:fillRect/>
+          </a:stretch>
+        </p:blipFill>
+        <p:spPr>
+          <a:xfrm>
+            <a:off x="4075793" y="3276600"/>
+            <a:ext cx="538540" cy="1127885"/>
+          </a:xfrm>
+          <a:prstGeom prst="rect">
+            <a:avLst/>
+          </a:prstGeom>
+        </p:spPr>
+      </p:pic>
+      <p:pic>
+        <p:nvPicPr>
+          <p:cNvPr id="26" name="Picture 25" descr="web.png"/>
+          <p:cNvPicPr>
+            <a:picLocks noChangeAspect="1"/>
+          </p:cNvPicPr>
+          <p:nvPr/>
+        </p:nvPicPr>
+        <p:blipFill>
+          <a:blip r:embed="rId4"/>
+          <a:stretch>
+            <a:fillRect/>
+          </a:stretch>
+        </p:blipFill>
+        <p:spPr>
+          <a:xfrm>
+            <a:off x="711087" y="3415466"/>
+            <a:ext cx="1016113" cy="1005952"/>
+          </a:xfrm>
+          <a:prstGeom prst="rect">
+            <a:avLst/>
+          </a:prstGeom>
+        </p:spPr>
+      </p:pic>
+      <p:pic>
+        <p:nvPicPr>
+          <p:cNvPr id="27" name="Picture 26" descr="phone.png"/>
+          <p:cNvPicPr>
+            <a:picLocks noChangeAspect="1"/>
+          </p:cNvPicPr>
+          <p:nvPr/>
+        </p:nvPicPr>
+        <p:blipFill>
+          <a:blip r:embed="rId3"/>
+          <a:stretch>
+            <a:fillRect/>
+          </a:stretch>
+        </p:blipFill>
+        <p:spPr>
+          <a:xfrm>
+            <a:off x="7579330" y="3802286"/>
+            <a:ext cx="371205" cy="777428"/>
+          </a:xfrm>
+          <a:prstGeom prst="rect">
+            <a:avLst/>
+          </a:prstGeom>
+        </p:spPr>
+      </p:pic>
+      <p:cxnSp>
+        <p:nvCxnSpPr>
+          <p:cNvPr id="29" name="Straight Connector 28"/>
+          <p:cNvCxnSpPr/>
+          <p:nvPr/>
+        </p:nvCxnSpPr>
+        <p:spPr>
+          <a:xfrm rot="5400000" flipH="1" flipV="1">
+            <a:off x="6865558" y="3497643"/>
+            <a:ext cx="1127885" cy="685800"/>
+          </a:xfrm>
+          <a:prstGeom prst="line">
+            <a:avLst/>
+          </a:prstGeom>
+          <a:ln w="38100" cap="flat" cmpd="sng" algn="ctr">
+            <a:solidFill>
+              <a:schemeClr val="tx1"/>
+            </a:solidFill>
+            <a:prstDash val="solid"/>
+            <a:round/>
+            <a:headEnd type="none" w="med" len="med"/>
+            <a:tailEnd type="none" w="med" len="med"/>
+          </a:ln>
+          <a:effectLst>
+            <a:outerShdw blurRad="40000" dist="20000" dir="5400000" rotWithShape="0">
+              <a:schemeClr val="tx1">
+                <a:alpha val="38000"/>
+              </a:schemeClr>
+            </a:outerShdw>
+          </a:effectLst>
+        </p:spPr>
+        <p:style>
+          <a:lnRef idx="2">
+            <a:schemeClr val="accent1"/>
+          </a:lnRef>
+          <a:fillRef idx="0">
+            <a:schemeClr val="accent1"/>
+          </a:fillRef>
+          <a:effectRef idx="1">
+            <a:schemeClr val="accent1"/>
+          </a:effectRef>
+          <a:fontRef idx="minor">
+            <a:schemeClr val="tx1"/>
+          </a:fontRef>
+        </p:style>
+      </p:cxnSp>
+      <p:sp>
+        <p:nvSpPr>
+          <p:cNvPr id="30" name="TextBox 29"/>
+          <p:cNvSpPr txBox="1"/>
+          <p:nvPr/>
+        </p:nvSpPr>
+        <p:spPr>
+          <a:xfrm>
+            <a:off x="6248399" y="4859867"/>
+            <a:ext cx="2285999" cy="646331"/>
+          </a:xfrm>
+          <a:prstGeom prst="rect">
+            <a:avLst/>
+          </a:prstGeom>
+          <a:noFill/>
+        </p:spPr>
+        <p:txBody>
+          <a:bodyPr wrap="square" rtlCol="0">
+            <a:spAutoFit/>
+          </a:bodyPr>
+          <a:lstStyle/>
+          <a:p>
+            <a:pPr algn="ctr"/>
+            <a:r>
+              <a:rPr lang="en-US" dirty="0" smtClean="0">
+                <a:latin typeface="Arial"/>
+                <a:cs typeface="Arial"/>
+              </a:rPr>
+              <a:t>p</a:t>
+            </a:r>
+            <a:r>
+              <a:rPr lang="en-US" dirty="0" smtClean="0">
+                <a:latin typeface="Arial"/>
+                <a:cs typeface="Arial"/>
+              </a:rPr>
+              <a:t>ublish </a:t>
+            </a:r>
+          </a:p>
+          <a:p>
+            <a:pPr algn="ctr"/>
+            <a:r>
+              <a:rPr lang="en-US" dirty="0" smtClean="0">
+                <a:latin typeface="Arial"/>
+                <a:cs typeface="Arial"/>
+              </a:rPr>
+              <a:t>web and mobile</a:t>
+            </a:r>
+            <a:endParaRPr lang="en-US" dirty="0">
+              <a:latin typeface="Arial"/>
+              <a:cs typeface="Arial"/>
+            </a:endParaRPr>
+          </a:p>
+        </p:txBody>
+      </p:sp>
+    </p:spTree>
+  </p:cSld>
+  <p:clrMapOvr>
+    <a:masterClrMapping/>
+  </p:clrMapOvr>
 </p:sld>
 </file>
 
@@ -5221,18 +5881,36 @@
   </a:themeElements>
   <a:objectDefaults>
     <a:spDef>
-      <a:spPr/>
-      <a:bodyPr/>
-      <a:lstStyle/>
+      <a:spPr>
+        <a:solidFill>
+          <a:srgbClr val="61BF1A"/>
+        </a:solidFill>
+        <a:ln w="76200" cap="flat" cmpd="sng" algn="ctr">
+          <a:solidFill>
+            <a:schemeClr val="tx1"/>
+          </a:solidFill>
+          <a:prstDash val="solid"/>
+          <a:round/>
+          <a:headEnd type="none" w="med" len="med"/>
+          <a:tailEnd type="none" w="med" len="med"/>
+        </a:ln>
+        <a:effectLst/>
+      </a:spPr>
+      <a:bodyPr rtlCol="0" anchor="ctr"/>
+      <a:lstStyle>
+        <a:defPPr algn="ctr">
+          <a:defRPr dirty="0" err="1" smtClean="0"/>
+        </a:defPPr>
+      </a:lstStyle>
       <a:style>
         <a:lnRef idx="1">
-          <a:schemeClr val="accent1"/>
+          <a:schemeClr val="accent3"/>
         </a:lnRef>
         <a:fillRef idx="3">
-          <a:schemeClr val="accent1"/>
+          <a:schemeClr val="accent3"/>
         </a:fillRef>
         <a:effectRef idx="2">
-          <a:schemeClr val="accent1"/>
+          <a:schemeClr val="accent3"/>
         </a:effectRef>
         <a:fontRef idx="minor">
           <a:schemeClr val="lt1"/>

</xml_diff>